<commit_message>
How to categorize translation material and...
</commit_message>
<xml_diff>
--- a/misc/翻訳対象の分類とプロセス（当方イメージ）20171107.pptx
+++ b/misc/翻訳対象の分類とプロセス（当方イメージ）20171107.pptx
@@ -3605,7 +3605,7 @@
           <p:nvPr>
             <p:extLst>
               <p:ext uri="{D42A27DB-BD31-4B8C-83A1-F6EECF244321}">
-                <p14:modId xmlns:p14="http://schemas.microsoft.com/office/powerpoint/2010/main" val="1494384778"/>
+                <p14:modId xmlns:p14="http://schemas.microsoft.com/office/powerpoint/2010/main" val="4246163687"/>
               </p:ext>
             </p:extLst>
           </p:nvPr>
@@ -3736,7 +3736,15 @@
                           <a:ea typeface="メイリオ" panose="020B0604030504040204" pitchFamily="50" charset="-128"/>
                           <a:cs typeface="メイリオ" panose="020B0604030504040204" pitchFamily="50" charset="-128"/>
                         </a:rPr>
-                        <a:t>①原作者の独自性が低い</a:t>
+                        <a:t>②原作者</a:t>
+                      </a:r>
+                      <a:r>
+                        <a:rPr kumimoji="1" lang="ja-JP" altLang="en-US" smtClean="0">
+                          <a:latin typeface="メイリオ" panose="020B0604030504040204" pitchFamily="50" charset="-128"/>
+                          <a:ea typeface="メイリオ" panose="020B0604030504040204" pitchFamily="50" charset="-128"/>
+                          <a:cs typeface="メイリオ" panose="020B0604030504040204" pitchFamily="50" charset="-128"/>
+                        </a:rPr>
+                        <a:t>の独自性が低い</a:t>
                       </a:r>
                       <a:r>
                         <a:rPr kumimoji="1" lang="en-US" altLang="ja-JP" smtClean="0">
@@ -3813,7 +3821,7 @@
                           <a:ea typeface="メイリオ" panose="020B0604030504040204" pitchFamily="50" charset="-128"/>
                           <a:cs typeface="メイリオ" panose="020B0604030504040204" pitchFamily="50" charset="-128"/>
                         </a:rPr>
-                        <a:t>翻訳量</a:t>
+                        <a:t>②翻訳量</a:t>
                       </a:r>
                       <a:endParaRPr kumimoji="1" lang="ja-JP" altLang="en-US">
                         <a:latin typeface="メイリオ" panose="020B0604030504040204" pitchFamily="50" charset="-128"/>
@@ -3850,7 +3858,7 @@
                           <a:ea typeface="メイリオ" panose="020B0604030504040204" pitchFamily="50" charset="-128"/>
                           <a:cs typeface="メイリオ" panose="020B0604030504040204" pitchFamily="50" charset="-128"/>
                         </a:rPr>
-                        <a:t>翻訳量</a:t>
+                        <a:t>②翻訳量</a:t>
                       </a:r>
                       <a:endParaRPr kumimoji="1" lang="ja-JP" altLang="en-US">
                         <a:latin typeface="メイリオ" panose="020B0604030504040204" pitchFamily="50" charset="-128"/>
@@ -4217,7 +4225,15 @@
                           <a:ea typeface="メイリオ" panose="020B0604030504040204" pitchFamily="50" charset="-128"/>
                           <a:cs typeface="メイリオ" panose="020B0604030504040204" pitchFamily="50" charset="-128"/>
                         </a:rPr>
-                        <a:t>更新頻度</a:t>
+                        <a:t>③更新</a:t>
+                      </a:r>
+                      <a:r>
+                        <a:rPr kumimoji="1" lang="ja-JP" altLang="en-US" smtClean="0">
+                          <a:latin typeface="メイリオ" panose="020B0604030504040204" pitchFamily="50" charset="-128"/>
+                          <a:ea typeface="メイリオ" panose="020B0604030504040204" pitchFamily="50" charset="-128"/>
+                          <a:cs typeface="メイリオ" panose="020B0604030504040204" pitchFamily="50" charset="-128"/>
+                        </a:rPr>
+                        <a:t>頻度</a:t>
                       </a:r>
                       <a:endParaRPr kumimoji="1" lang="ja-JP" altLang="en-US">
                         <a:latin typeface="メイリオ" panose="020B0604030504040204" pitchFamily="50" charset="-128"/>

</xml_diff>